<commit_message>
Added more lightning talk materials. Still missing those from Volans.
</commit_message>
<xml_diff>
--- a/projects/p1/lightningtalks/andromeda/andromeda-p1.pptx
+++ b/projects/p1/lightningtalks/andromeda/andromeda-p1.pptx
@@ -8,6 +8,8 @@
     <p:sldId id="258" r:id="rId2"/>
     <p:sldId id="256" r:id="rId3"/>
     <p:sldId id="257" r:id="rId4"/>
+    <p:sldId id="259" r:id="rId5"/>
+    <p:sldId id="260" r:id="rId6"/>
   </p:sldIdLst>
   <p:sldSz cx="12192000" cy="6858000"/>
   <p:notesSz cx="6858000" cy="9144000"/>
@@ -106,7 +108,27 @@
       </a:defRPr>
     </a:lvl9pPr>
   </p:defaultTextStyle>
+  <p:extLst>
+    <p:ext uri="{EFAFB233-063F-42B5-8137-9DF3F51BA10A}">
+      <p15:sldGuideLst xmlns:p15="http://schemas.microsoft.com/office/powerpoint/2012/main">
+        <p15:guide id="1" orient="horz" pos="2160">
+          <p15:clr>
+            <a:srgbClr val="A4A3A4"/>
+          </p15:clr>
+        </p15:guide>
+        <p15:guide id="2" pos="3840">
+          <p15:clr>
+            <a:srgbClr val="A4A3A4"/>
+          </p15:clr>
+        </p15:guide>
+      </p15:sldGuideLst>
+    </p:ext>
+  </p:extLst>
 </p:presentation>
+</file>
+
+<file path=ppt/revisionInfo.xml><?xml version="1.0" encoding="utf-8"?>
+<p1510:revInfo xmlns:a="http://schemas.openxmlformats.org/drawingml/2006/main" xmlns:r="http://schemas.openxmlformats.org/officeDocument/2006/relationships" xmlns:p1510="http://schemas.microsoft.com/office/powerpoint/2015/10/main"/>
 </file>
 
 <file path=ppt/slideLayouts/slideLayout1.xml><?xml version="1.0" encoding="utf-8"?>
@@ -160,7 +182,7 @@
           </a:lstStyle>
           <a:p>
             <a:r>
-              <a:rPr lang="x-none" smtClean="0"/>
+              <a:rPr lang="x-none"/>
               <a:t>Click to edit Master title style</a:t>
             </a:r>
             <a:endParaRPr lang="en-US" dirty="0"/>
@@ -278,7 +300,7 @@
           </a:lstStyle>
           <a:p>
             <a:r>
-              <a:rPr lang="x-none" smtClean="0"/>
+              <a:rPr lang="x-none"/>
               <a:t>Click to edit Master subtitle style</a:t>
             </a:r>
             <a:endParaRPr lang="en-US" dirty="0"/>
@@ -302,7 +324,7 @@
           <a:p>
             <a:fld id="{20283C12-91E7-9849-AA7E-AB0C093285FD}" type="datetimeFigureOut">
               <a:rPr lang="en-US" smtClean="0"/>
-              <a:t>2/7/18</a:t>
+              <a:t>2/7/2018</a:t>
             </a:fld>
             <a:endParaRPr lang="en-US"/>
           </a:p>
@@ -491,7 +513,7 @@
           <a:lstStyle/>
           <a:p>
             <a:r>
-              <a:rPr lang="x-none" smtClean="0"/>
+              <a:rPr lang="x-none"/>
               <a:t>Click to edit Master title style</a:t>
             </a:r>
             <a:endParaRPr lang="en-US"/>
@@ -515,35 +537,35 @@
           <a:p>
             <a:pPr lvl="0"/>
             <a:r>
-              <a:rPr lang="x-none" smtClean="0"/>
+              <a:rPr lang="x-none"/>
               <a:t>Click to edit Master text styles</a:t>
             </a:r>
           </a:p>
           <a:p>
             <a:pPr lvl="1"/>
             <a:r>
-              <a:rPr lang="x-none" smtClean="0"/>
+              <a:rPr lang="x-none"/>
               <a:t>Second level</a:t>
             </a:r>
           </a:p>
           <a:p>
             <a:pPr lvl="2"/>
             <a:r>
-              <a:rPr lang="x-none" smtClean="0"/>
+              <a:rPr lang="x-none"/>
               <a:t>Third level</a:t>
             </a:r>
           </a:p>
           <a:p>
             <a:pPr lvl="3"/>
             <a:r>
-              <a:rPr lang="x-none" smtClean="0"/>
+              <a:rPr lang="x-none"/>
               <a:t>Fourth level</a:t>
             </a:r>
           </a:p>
           <a:p>
             <a:pPr lvl="4"/>
             <a:r>
-              <a:rPr lang="x-none" smtClean="0"/>
+              <a:rPr lang="x-none"/>
               <a:t>Fifth level</a:t>
             </a:r>
             <a:endParaRPr lang="en-US"/>
@@ -567,7 +589,7 @@
           <a:p>
             <a:fld id="{20283C12-91E7-9849-AA7E-AB0C093285FD}" type="datetimeFigureOut">
               <a:rPr lang="en-US" smtClean="0"/>
-              <a:t>2/7/18</a:t>
+              <a:t>2/7/2018</a:t>
             </a:fld>
             <a:endParaRPr lang="en-US"/>
           </a:p>
@@ -661,7 +683,7 @@
           <a:lstStyle/>
           <a:p>
             <a:r>
-              <a:rPr lang="x-none" smtClean="0"/>
+              <a:rPr lang="x-none"/>
               <a:t>Click to edit Master title style</a:t>
             </a:r>
             <a:endParaRPr lang="en-US"/>
@@ -690,35 +712,35 @@
           <a:p>
             <a:pPr lvl="0"/>
             <a:r>
-              <a:rPr lang="x-none" smtClean="0"/>
+              <a:rPr lang="x-none"/>
               <a:t>Click to edit Master text styles</a:t>
             </a:r>
           </a:p>
           <a:p>
             <a:pPr lvl="1"/>
             <a:r>
-              <a:rPr lang="x-none" smtClean="0"/>
+              <a:rPr lang="x-none"/>
               <a:t>Second level</a:t>
             </a:r>
           </a:p>
           <a:p>
             <a:pPr lvl="2"/>
             <a:r>
-              <a:rPr lang="x-none" smtClean="0"/>
+              <a:rPr lang="x-none"/>
               <a:t>Third level</a:t>
             </a:r>
           </a:p>
           <a:p>
             <a:pPr lvl="3"/>
             <a:r>
-              <a:rPr lang="x-none" smtClean="0"/>
+              <a:rPr lang="x-none"/>
               <a:t>Fourth level</a:t>
             </a:r>
           </a:p>
           <a:p>
             <a:pPr lvl="4"/>
             <a:r>
-              <a:rPr lang="x-none" smtClean="0"/>
+              <a:rPr lang="x-none"/>
               <a:t>Fifth level</a:t>
             </a:r>
             <a:endParaRPr lang="en-US"/>
@@ -742,7 +764,7 @@
           <a:p>
             <a:fld id="{20283C12-91E7-9849-AA7E-AB0C093285FD}" type="datetimeFigureOut">
               <a:rPr lang="en-US" smtClean="0"/>
-              <a:t>2/7/18</a:t>
+              <a:t>2/7/2018</a:t>
             </a:fld>
             <a:endParaRPr lang="en-US"/>
           </a:p>
@@ -831,7 +853,7 @@
           <a:lstStyle/>
           <a:p>
             <a:r>
-              <a:rPr lang="x-none" smtClean="0"/>
+              <a:rPr lang="x-none"/>
               <a:t>Click to edit Master title style</a:t>
             </a:r>
             <a:endParaRPr lang="en-US"/>
@@ -855,35 +877,35 @@
           <a:p>
             <a:pPr lvl="0"/>
             <a:r>
-              <a:rPr lang="x-none" smtClean="0"/>
+              <a:rPr lang="x-none"/>
               <a:t>Click to edit Master text styles</a:t>
             </a:r>
           </a:p>
           <a:p>
             <a:pPr lvl="1"/>
             <a:r>
-              <a:rPr lang="x-none" smtClean="0"/>
+              <a:rPr lang="x-none"/>
               <a:t>Second level</a:t>
             </a:r>
           </a:p>
           <a:p>
             <a:pPr lvl="2"/>
             <a:r>
-              <a:rPr lang="x-none" smtClean="0"/>
+              <a:rPr lang="x-none"/>
               <a:t>Third level</a:t>
             </a:r>
           </a:p>
           <a:p>
             <a:pPr lvl="3"/>
             <a:r>
-              <a:rPr lang="x-none" smtClean="0"/>
+              <a:rPr lang="x-none"/>
               <a:t>Fourth level</a:t>
             </a:r>
           </a:p>
           <a:p>
             <a:pPr lvl="4"/>
             <a:r>
-              <a:rPr lang="x-none" smtClean="0"/>
+              <a:rPr lang="x-none"/>
               <a:t>Fifth level</a:t>
             </a:r>
             <a:endParaRPr lang="en-US" dirty="0"/>
@@ -907,7 +929,7 @@
           <a:p>
             <a:fld id="{20283C12-91E7-9849-AA7E-AB0C093285FD}" type="datetimeFigureOut">
               <a:rPr lang="en-US" smtClean="0"/>
-              <a:t>2/7/18</a:t>
+              <a:t>2/7/2018</a:t>
             </a:fld>
             <a:endParaRPr lang="en-US"/>
           </a:p>
@@ -1014,7 +1036,7 @@
           </a:lstStyle>
           <a:p>
             <a:r>
-              <a:rPr lang="x-none" smtClean="0"/>
+              <a:rPr lang="x-none"/>
               <a:t>Click to edit Master title style</a:t>
             </a:r>
             <a:endParaRPr lang="en-US" dirty="0"/>
@@ -1133,7 +1155,7 @@
           <a:p>
             <a:pPr lvl="0"/>
             <a:r>
-              <a:rPr lang="x-none" smtClean="0"/>
+              <a:rPr lang="x-none"/>
               <a:t>Click to edit Master text styles</a:t>
             </a:r>
           </a:p>
@@ -1156,7 +1178,7 @@
           <a:p>
             <a:fld id="{20283C12-91E7-9849-AA7E-AB0C093285FD}" type="datetimeFigureOut">
               <a:rPr lang="en-US" smtClean="0"/>
-              <a:t>2/7/18</a:t>
+              <a:t>2/7/2018</a:t>
             </a:fld>
             <a:endParaRPr lang="en-US"/>
           </a:p>
@@ -1245,7 +1267,7 @@
           <a:lstStyle/>
           <a:p>
             <a:r>
-              <a:rPr lang="x-none" smtClean="0"/>
+              <a:rPr lang="x-none"/>
               <a:t>Click to edit Master title style</a:t>
             </a:r>
             <a:endParaRPr lang="en-US"/>
@@ -1302,35 +1324,35 @@
           <a:p>
             <a:pPr lvl="0"/>
             <a:r>
-              <a:rPr lang="x-none" smtClean="0"/>
+              <a:rPr lang="x-none"/>
               <a:t>Click to edit Master text styles</a:t>
             </a:r>
           </a:p>
           <a:p>
             <a:pPr lvl="1"/>
             <a:r>
-              <a:rPr lang="x-none" smtClean="0"/>
+              <a:rPr lang="x-none"/>
               <a:t>Second level</a:t>
             </a:r>
           </a:p>
           <a:p>
             <a:pPr lvl="2"/>
             <a:r>
-              <a:rPr lang="x-none" smtClean="0"/>
+              <a:rPr lang="x-none"/>
               <a:t>Third level</a:t>
             </a:r>
           </a:p>
           <a:p>
             <a:pPr lvl="3"/>
             <a:r>
-              <a:rPr lang="x-none" smtClean="0"/>
+              <a:rPr lang="x-none"/>
               <a:t>Fourth level</a:t>
             </a:r>
           </a:p>
           <a:p>
             <a:pPr lvl="4"/>
             <a:r>
-              <a:rPr lang="x-none" smtClean="0"/>
+              <a:rPr lang="x-none"/>
               <a:t>Fifth level</a:t>
             </a:r>
             <a:endParaRPr lang="en-US" dirty="0"/>
@@ -1387,35 +1409,35 @@
           <a:p>
             <a:pPr lvl="0"/>
             <a:r>
-              <a:rPr lang="x-none" smtClean="0"/>
+              <a:rPr lang="x-none"/>
               <a:t>Click to edit Master text styles</a:t>
             </a:r>
           </a:p>
           <a:p>
             <a:pPr lvl="1"/>
             <a:r>
-              <a:rPr lang="x-none" smtClean="0"/>
+              <a:rPr lang="x-none"/>
               <a:t>Second level</a:t>
             </a:r>
           </a:p>
           <a:p>
             <a:pPr lvl="2"/>
             <a:r>
-              <a:rPr lang="x-none" smtClean="0"/>
+              <a:rPr lang="x-none"/>
               <a:t>Third level</a:t>
             </a:r>
           </a:p>
           <a:p>
             <a:pPr lvl="3"/>
             <a:r>
-              <a:rPr lang="x-none" smtClean="0"/>
+              <a:rPr lang="x-none"/>
               <a:t>Fourth level</a:t>
             </a:r>
           </a:p>
           <a:p>
             <a:pPr lvl="4"/>
             <a:r>
-              <a:rPr lang="x-none" smtClean="0"/>
+              <a:rPr lang="x-none"/>
               <a:t>Fifth level</a:t>
             </a:r>
             <a:endParaRPr lang="en-US" dirty="0"/>
@@ -1439,7 +1461,7 @@
           <a:p>
             <a:fld id="{20283C12-91E7-9849-AA7E-AB0C093285FD}" type="datetimeFigureOut">
               <a:rPr lang="en-US" smtClean="0"/>
-              <a:t>2/7/18</a:t>
+              <a:t>2/7/2018</a:t>
             </a:fld>
             <a:endParaRPr lang="en-US"/>
           </a:p>
@@ -1532,7 +1554,7 @@
           </a:lstStyle>
           <a:p>
             <a:r>
-              <a:rPr lang="x-none" smtClean="0"/>
+              <a:rPr lang="x-none"/>
               <a:t>Click to edit Master title style</a:t>
             </a:r>
             <a:endParaRPr lang="en-US"/>
@@ -1605,7 +1627,7 @@
           <a:p>
             <a:pPr lvl="0"/>
             <a:r>
-              <a:rPr lang="x-none" smtClean="0"/>
+              <a:rPr lang="x-none"/>
               <a:t>Click to edit Master text styles</a:t>
             </a:r>
           </a:p>
@@ -1661,35 +1683,35 @@
           <a:p>
             <a:pPr lvl="0"/>
             <a:r>
-              <a:rPr lang="x-none" smtClean="0"/>
+              <a:rPr lang="x-none"/>
               <a:t>Click to edit Master text styles</a:t>
             </a:r>
           </a:p>
           <a:p>
             <a:pPr lvl="1"/>
             <a:r>
-              <a:rPr lang="x-none" smtClean="0"/>
+              <a:rPr lang="x-none"/>
               <a:t>Second level</a:t>
             </a:r>
           </a:p>
           <a:p>
             <a:pPr lvl="2"/>
             <a:r>
-              <a:rPr lang="x-none" smtClean="0"/>
+              <a:rPr lang="x-none"/>
               <a:t>Third level</a:t>
             </a:r>
           </a:p>
           <a:p>
             <a:pPr lvl="3"/>
             <a:r>
-              <a:rPr lang="x-none" smtClean="0"/>
+              <a:rPr lang="x-none"/>
               <a:t>Fourth level</a:t>
             </a:r>
           </a:p>
           <a:p>
             <a:pPr lvl="4"/>
             <a:r>
-              <a:rPr lang="x-none" smtClean="0"/>
+              <a:rPr lang="x-none"/>
               <a:t>Fifth level</a:t>
             </a:r>
             <a:endParaRPr lang="en-US" dirty="0"/>
@@ -1770,7 +1792,7 @@
               <a:buNone/>
             </a:pPr>
             <a:r>
-              <a:rPr lang="x-none" smtClean="0"/>
+              <a:rPr lang="x-none"/>
               <a:t>Click to edit Master text styles</a:t>
             </a:r>
           </a:p>
@@ -1826,35 +1848,35 @@
           <a:p>
             <a:pPr lvl="0"/>
             <a:r>
-              <a:rPr lang="x-none" smtClean="0"/>
+              <a:rPr lang="x-none"/>
               <a:t>Click to edit Master text styles</a:t>
             </a:r>
           </a:p>
           <a:p>
             <a:pPr lvl="1"/>
             <a:r>
-              <a:rPr lang="x-none" smtClean="0"/>
+              <a:rPr lang="x-none"/>
               <a:t>Second level</a:t>
             </a:r>
           </a:p>
           <a:p>
             <a:pPr lvl="2"/>
             <a:r>
-              <a:rPr lang="x-none" smtClean="0"/>
+              <a:rPr lang="x-none"/>
               <a:t>Third level</a:t>
             </a:r>
           </a:p>
           <a:p>
             <a:pPr lvl="3"/>
             <a:r>
-              <a:rPr lang="x-none" smtClean="0"/>
+              <a:rPr lang="x-none"/>
               <a:t>Fourth level</a:t>
             </a:r>
           </a:p>
           <a:p>
             <a:pPr lvl="4"/>
             <a:r>
-              <a:rPr lang="x-none" smtClean="0"/>
+              <a:rPr lang="x-none"/>
               <a:t>Fifth level</a:t>
             </a:r>
             <a:endParaRPr lang="en-US" dirty="0"/>
@@ -1878,7 +1900,7 @@
           <a:p>
             <a:fld id="{20283C12-91E7-9849-AA7E-AB0C093285FD}" type="datetimeFigureOut">
               <a:rPr lang="en-US" smtClean="0"/>
-              <a:t>2/7/18</a:t>
+              <a:t>2/7/2018</a:t>
             </a:fld>
             <a:endParaRPr lang="en-US"/>
           </a:p>
@@ -1967,7 +1989,7 @@
           <a:lstStyle/>
           <a:p>
             <a:r>
-              <a:rPr lang="x-none" smtClean="0"/>
+              <a:rPr lang="x-none"/>
               <a:t>Click to edit Master title style</a:t>
             </a:r>
             <a:endParaRPr lang="en-US"/>
@@ -1991,7 +2013,7 @@
           <a:p>
             <a:fld id="{20283C12-91E7-9849-AA7E-AB0C093285FD}" type="datetimeFigureOut">
               <a:rPr lang="en-US" smtClean="0"/>
-              <a:t>2/7/18</a:t>
+              <a:t>2/7/2018</a:t>
             </a:fld>
             <a:endParaRPr lang="en-US"/>
           </a:p>
@@ -2081,7 +2103,7 @@
           <a:p>
             <a:fld id="{20283C12-91E7-9849-AA7E-AB0C093285FD}" type="datetimeFigureOut">
               <a:rPr lang="en-US" smtClean="0"/>
-              <a:t>2/7/18</a:t>
+              <a:t>2/7/2018</a:t>
             </a:fld>
             <a:endParaRPr lang="en-US"/>
           </a:p>
@@ -2204,35 +2226,35 @@
           <a:p>
             <a:pPr lvl="0"/>
             <a:r>
-              <a:rPr lang="x-none" smtClean="0"/>
+              <a:rPr lang="x-none"/>
               <a:t>Click to edit Master text styles</a:t>
             </a:r>
           </a:p>
           <a:p>
             <a:pPr lvl="1"/>
             <a:r>
-              <a:rPr lang="x-none" smtClean="0"/>
+              <a:rPr lang="x-none"/>
               <a:t>Second level</a:t>
             </a:r>
           </a:p>
           <a:p>
             <a:pPr lvl="2"/>
             <a:r>
-              <a:rPr lang="x-none" smtClean="0"/>
+              <a:rPr lang="x-none"/>
               <a:t>Third level</a:t>
             </a:r>
           </a:p>
           <a:p>
             <a:pPr lvl="3"/>
             <a:r>
-              <a:rPr lang="x-none" smtClean="0"/>
+              <a:rPr lang="x-none"/>
               <a:t>Fourth level</a:t>
             </a:r>
           </a:p>
           <a:p>
             <a:pPr lvl="4"/>
             <a:r>
-              <a:rPr lang="x-none" smtClean="0"/>
+              <a:rPr lang="x-none"/>
               <a:t>Fifth level</a:t>
             </a:r>
             <a:endParaRPr lang="en-US" dirty="0"/>
@@ -2300,7 +2322,7 @@
           <a:p>
             <a:pPr lvl="0"/>
             <a:r>
-              <a:rPr lang="x-none" smtClean="0"/>
+              <a:rPr lang="x-none"/>
               <a:t>Click to edit Master text styles</a:t>
             </a:r>
           </a:p>
@@ -2323,7 +2345,7 @@
           <a:p>
             <a:fld id="{20283C12-91E7-9849-AA7E-AB0C093285FD}" type="datetimeFigureOut">
               <a:rPr lang="en-US" smtClean="0"/>
-              <a:t>2/7/18</a:t>
+              <a:t>2/7/2018</a:t>
             </a:fld>
             <a:endParaRPr lang="en-US"/>
           </a:p>
@@ -2387,7 +2409,7 @@
           <a:lstStyle/>
           <a:p>
             <a:r>
-              <a:rPr lang="x-none" smtClean="0"/>
+              <a:rPr lang="x-none"/>
               <a:t>Click to edit Master title style</a:t>
             </a:r>
             <a:endParaRPr lang="en-US"/>
@@ -2528,7 +2550,7 @@
           </a:lstStyle>
           <a:p>
             <a:r>
-              <a:rPr lang="x-none" smtClean="0"/>
+              <a:rPr lang="x-none"/>
               <a:t>Drag picture to placeholder or click icon to add</a:t>
             </a:r>
             <a:endParaRPr lang="en-US"/>
@@ -2594,7 +2616,7 @@
           <a:p>
             <a:pPr lvl="0"/>
             <a:r>
-              <a:rPr lang="x-none" smtClean="0"/>
+              <a:rPr lang="x-none"/>
               <a:t>Click to edit Master text styles</a:t>
             </a:r>
           </a:p>
@@ -2617,7 +2639,7 @@
           <a:p>
             <a:fld id="{20283C12-91E7-9849-AA7E-AB0C093285FD}" type="datetimeFigureOut">
               <a:rPr lang="en-US" smtClean="0"/>
-              <a:t>2/7/18</a:t>
+              <a:t>2/7/2018</a:t>
             </a:fld>
             <a:endParaRPr lang="en-US"/>
           </a:p>
@@ -2700,7 +2722,7 @@
           </a:lstStyle>
           <a:p>
             <a:r>
-              <a:rPr lang="x-none" smtClean="0"/>
+              <a:rPr lang="x-none"/>
               <a:t>Click to edit Master title style</a:t>
             </a:r>
             <a:endParaRPr lang="en-US" dirty="0"/>
@@ -2809,7 +2831,7 @@
           <a:lstStyle/>
           <a:p>
             <a:r>
-              <a:rPr lang="x-none" smtClean="0"/>
+              <a:rPr lang="x-none"/>
               <a:t>Click to edit Master title style</a:t>
             </a:r>
             <a:endParaRPr lang="en-US" dirty="0"/>
@@ -2843,35 +2865,35 @@
           <a:p>
             <a:pPr lvl="0"/>
             <a:r>
-              <a:rPr lang="x-none" smtClean="0"/>
+              <a:rPr lang="x-none"/>
               <a:t>Click to edit Master text styles</a:t>
             </a:r>
           </a:p>
           <a:p>
             <a:pPr lvl="1"/>
             <a:r>
-              <a:rPr lang="x-none" smtClean="0"/>
+              <a:rPr lang="x-none"/>
               <a:t>Second level</a:t>
             </a:r>
           </a:p>
           <a:p>
             <a:pPr lvl="2"/>
             <a:r>
-              <a:rPr lang="x-none" smtClean="0"/>
+              <a:rPr lang="x-none"/>
               <a:t>Third level</a:t>
             </a:r>
           </a:p>
           <a:p>
             <a:pPr lvl="3"/>
             <a:r>
-              <a:rPr lang="x-none" smtClean="0"/>
+              <a:rPr lang="x-none"/>
               <a:t>Fourth level</a:t>
             </a:r>
           </a:p>
           <a:p>
             <a:pPr lvl="4"/>
             <a:r>
-              <a:rPr lang="x-none" smtClean="0"/>
+              <a:rPr lang="x-none"/>
               <a:t>Fifth level</a:t>
             </a:r>
             <a:endParaRPr lang="en-US" dirty="0"/>
@@ -2911,7 +2933,7 @@
           <a:p>
             <a:fld id="{20283C12-91E7-9849-AA7E-AB0C093285FD}" type="datetimeFigureOut">
               <a:rPr lang="en-US" smtClean="0"/>
-              <a:t>2/7/18</a:t>
+              <a:t>2/7/2018</a:t>
             </a:fld>
             <a:endParaRPr lang="en-US"/>
           </a:p>
@@ -3449,53 +3471,49 @@
           <a:lstStyle/>
           <a:p>
             <a:r>
-              <a:rPr lang="en-US" sz="2800" dirty="0" smtClean="0"/>
+              <a:rPr lang="en-US" sz="2800" dirty="0"/>
               <a:t>Data Science Practicum, Project 1</a:t>
-            </a:r>
-            <a:r>
-              <a:rPr lang="en-US" sz="2800" dirty="0"/>
-              <a:t/>
             </a:r>
             <a:br>
               <a:rPr lang="en-US" sz="2800" dirty="0"/>
             </a:br>
             <a:r>
-              <a:rPr lang="en-US" sz="2800" dirty="0" err="1" smtClean="0"/>
+              <a:rPr lang="en-US" sz="2800" dirty="0" err="1"/>
               <a:t>Weiwen</a:t>
             </a:r>
             <a:r>
-              <a:rPr lang="en-US" sz="2800" dirty="0" smtClean="0"/>
+              <a:rPr lang="en-US" sz="2800" dirty="0"/>
               <a:t> </a:t>
             </a:r>
             <a:r>
-              <a:rPr lang="en-US" sz="2800" dirty="0" err="1" smtClean="0"/>
+              <a:rPr lang="en-US" sz="2800" dirty="0" err="1"/>
               <a:t>Xu</a:t>
             </a:r>
             <a:r>
-              <a:rPr lang="en-US" sz="2800" dirty="0" smtClean="0"/>
+              <a:rPr lang="en-US" sz="2800" dirty="0"/>
               <a:t>, I-</a:t>
             </a:r>
             <a:r>
-              <a:rPr lang="en-US" sz="2800" dirty="0" err="1" smtClean="0"/>
+              <a:rPr lang="en-US" sz="2800" dirty="0" err="1"/>
               <a:t>Huei</a:t>
             </a:r>
             <a:r>
-              <a:rPr lang="en-US" sz="2800" dirty="0" smtClean="0"/>
+              <a:rPr lang="en-US" sz="2800" dirty="0"/>
               <a:t> Ho, </a:t>
             </a:r>
             <a:r>
-              <a:rPr lang="en-US" sz="2800" dirty="0" err="1" smtClean="0"/>
+              <a:rPr lang="en-US" sz="2800" dirty="0" err="1"/>
               <a:t>Nihal</a:t>
             </a:r>
             <a:r>
-              <a:rPr lang="en-US" sz="2800" dirty="0" smtClean="0"/>
+              <a:rPr lang="en-US" sz="2800" dirty="0"/>
               <a:t> </a:t>
             </a:r>
             <a:r>
-              <a:rPr lang="en-US" sz="2800" dirty="0" err="1" smtClean="0"/>
+              <a:rPr lang="en-US" sz="2800" dirty="0" err="1"/>
               <a:t>Soans</a:t>
             </a:r>
-            <a:endParaRPr lang="en-US" sz="2800" dirty="0" smtClean="0"/>
+            <a:endParaRPr lang="en-US" sz="2800" dirty="0"/>
           </a:p>
         </p:txBody>
       </p:sp>
@@ -3552,164 +3570,95 @@
           <a:lstStyle/>
           <a:p>
             <a:r>
-              <a:rPr lang="en-US" sz="2400" dirty="0" smtClean="0"/>
+              <a:rPr lang="en-US" sz="2400" dirty="0"/>
               <a:t>What we did:</a:t>
             </a:r>
           </a:p>
           <a:p>
             <a:r>
               <a:rPr lang="en-US" sz="2400" dirty="0"/>
-              <a:t>	F</a:t>
-            </a:r>
-            <a:r>
-              <a:rPr lang="en-US" sz="2400" dirty="0" smtClean="0"/>
-              <a:t>eatures: Word </a:t>
-            </a:r>
+              <a:t>	Features: Word Count</a:t>
+            </a:r>
+          </a:p>
+          <a:p>
             <a:r>
               <a:rPr lang="en-US" sz="2400" dirty="0"/>
-              <a:t>C</a:t>
-            </a:r>
-            <a:r>
-              <a:rPr lang="en-US" sz="2400" dirty="0" smtClean="0"/>
-              <a:t>ount</a:t>
-            </a:r>
-          </a:p>
-          <a:p>
+              <a:t>		(remove </a:t>
+            </a:r>
+            <a:r>
+              <a:rPr lang="mr-IN" sz="2400" dirty="0"/>
+              <a:t>–</a:t>
+            </a:r>
             <a:r>
               <a:rPr lang="en-US" sz="2400" dirty="0"/>
-              <a:t>	</a:t>
-            </a:r>
-            <a:r>
-              <a:rPr lang="en-US" sz="2400" dirty="0" smtClean="0"/>
-              <a:t>	(remove </a:t>
-            </a:r>
-            <a:r>
-              <a:rPr lang="mr-IN" sz="2400" dirty="0" smtClean="0"/>
-              <a:t>–</a:t>
-            </a:r>
-            <a:r>
-              <a:rPr lang="en-US" sz="2400" dirty="0" smtClean="0"/>
               <a:t> between words</a:t>
             </a:r>
           </a:p>
           <a:p>
             <a:r>
               <a:rPr lang="en-US" sz="2400" dirty="0"/>
-              <a:t>	</a:t>
-            </a:r>
-            <a:r>
-              <a:rPr lang="en-US" sz="2400" dirty="0" smtClean="0"/>
-              <a:t>	 remove &amp;</a:t>
-            </a:r>
-            <a:r>
-              <a:rPr lang="en-US" sz="2400" dirty="0" err="1" smtClean="0"/>
+              <a:t>		 remove &amp;</a:t>
+            </a:r>
+            <a:r>
+              <a:rPr lang="en-US" sz="2400" dirty="0" err="1"/>
               <a:t>quot</a:t>
             </a:r>
-            <a:endParaRPr lang="en-US" sz="2400" dirty="0" smtClean="0"/>
+            <a:endParaRPr lang="en-US" sz="2400" dirty="0"/>
           </a:p>
           <a:p>
             <a:r>
               <a:rPr lang="en-US" sz="2400" dirty="0"/>
-              <a:t>	</a:t>
-            </a:r>
-            <a:r>
-              <a:rPr lang="en-US" sz="2400" dirty="0" smtClean="0"/>
-              <a:t>	 remove punctuation from both end</a:t>
+              <a:t>		 remove punctuation from both end</a:t>
             </a:r>
           </a:p>
           <a:p>
             <a:r>
               <a:rPr lang="en-US" sz="2400" dirty="0"/>
-              <a:t>	</a:t>
-            </a:r>
-            <a:r>
-              <a:rPr lang="en-US" sz="2400" dirty="0" smtClean="0"/>
-              <a:t>	 </a:t>
-            </a:r>
-            <a:r>
-              <a:rPr lang="en-US" sz="2400" dirty="0" err="1" smtClean="0"/>
+              <a:t>		 </a:t>
+            </a:r>
+            <a:r>
+              <a:rPr lang="en-US" sz="2400" dirty="0" err="1"/>
               <a:t>Lemmatizer</a:t>
             </a:r>
-            <a:endParaRPr lang="en-US" sz="2400" dirty="0" smtClean="0"/>
+            <a:endParaRPr lang="en-US" sz="2400" dirty="0"/>
           </a:p>
           <a:p>
             <a:r>
               <a:rPr lang="en-US" sz="2400" dirty="0"/>
-              <a:t>	</a:t>
-            </a:r>
-            <a:r>
-              <a:rPr lang="en-US" sz="2400" dirty="0" smtClean="0"/>
-              <a:t>	 stemming (Porter, Lancaster)</a:t>
+              <a:t>		 stemming (Porter, Lancaster)</a:t>
             </a:r>
           </a:p>
           <a:p>
             <a:r>
               <a:rPr lang="en-US" sz="2400" dirty="0"/>
-              <a:t>	</a:t>
-            </a:r>
-            <a:r>
-              <a:rPr lang="en-US" sz="2400" dirty="0" smtClean="0"/>
-              <a:t>	 remove punctuation from both end (it’s -&gt; it’)</a:t>
+              <a:t>		 remove punctuation from both end (it’s -&gt; it’)</a:t>
             </a:r>
           </a:p>
           <a:p>
             <a:r>
               <a:rPr lang="en-US" sz="2400" dirty="0"/>
-              <a:t>	</a:t>
-            </a:r>
-            <a:r>
-              <a:rPr lang="en-US" sz="2400" dirty="0" smtClean="0"/>
-              <a:t>	 remove </a:t>
-            </a:r>
-            <a:r>
-              <a:rPr lang="en-US" sz="2400" dirty="0" err="1" smtClean="0"/>
+              <a:t>		 remove </a:t>
+            </a:r>
+            <a:r>
+              <a:rPr lang="en-US" sz="2400" dirty="0" err="1"/>
               <a:t>stopwords</a:t>
             </a:r>
             <a:r>
-              <a:rPr lang="en-US" sz="2400" dirty="0" smtClean="0"/>
+              <a:rPr lang="en-US" sz="2400" dirty="0"/>
               <a:t>)	</a:t>
             </a:r>
           </a:p>
           <a:p>
             <a:r>
               <a:rPr lang="en-US" sz="2400" dirty="0"/>
-              <a:t>	M</a:t>
-            </a:r>
-            <a:r>
-              <a:rPr lang="en-US" sz="2400" dirty="0" smtClean="0"/>
-              <a:t>odeling: </a:t>
-            </a:r>
+              <a:t>	Modeling: Naïve Bayes</a:t>
+            </a:r>
+          </a:p>
+          <a:p>
             <a:r>
               <a:rPr lang="en-US" sz="2400" dirty="0"/>
-              <a:t>N</a:t>
-            </a:r>
-            <a:r>
-              <a:rPr lang="en-US" sz="2400" dirty="0" smtClean="0"/>
-              <a:t>aïve </a:t>
-            </a:r>
-            <a:r>
-              <a:rPr lang="en-US" sz="2400" dirty="0"/>
-              <a:t>B</a:t>
-            </a:r>
-            <a:r>
-              <a:rPr lang="en-US" sz="2400" dirty="0" smtClean="0"/>
-              <a:t>ayes</a:t>
-            </a:r>
-          </a:p>
-          <a:p>
-            <a:r>
-              <a:rPr lang="en-US" sz="2400" dirty="0"/>
-              <a:t>	</a:t>
-            </a:r>
-            <a:r>
-              <a:rPr lang="en-US" sz="2400" dirty="0" smtClean="0"/>
-              <a:t>	  (Laplace </a:t>
-            </a:r>
-            <a:r>
-              <a:rPr lang="en-US" sz="2400" dirty="0" smtClean="0"/>
-              <a:t>smoothing)</a:t>
-            </a:r>
-            <a:endParaRPr lang="en-US" sz="2400" dirty="0" smtClean="0"/>
+              <a:t>		  (Laplace smoothing)</a:t>
+            </a:r>
           </a:p>
           <a:p>
             <a:r>
@@ -3807,6 +3756,299 @@
     <p:extLst>
       <p:ext uri="{BB962C8B-B14F-4D97-AF65-F5344CB8AC3E}">
         <p14:creationId xmlns:p14="http://schemas.microsoft.com/office/powerpoint/2010/main" val="1863591196"/>
+      </p:ext>
+    </p:extLst>
+  </p:cSld>
+  <p:clrMapOvr>
+    <a:masterClrMapping/>
+  </p:clrMapOvr>
+</p:sld>
+</file>
+
+<file path=ppt/slides/slide4.xml><?xml version="1.0" encoding="utf-8"?>
+<p:sld xmlns:a="http://schemas.openxmlformats.org/drawingml/2006/main" xmlns:r="http://schemas.openxmlformats.org/officeDocument/2006/relationships" xmlns:p="http://schemas.openxmlformats.org/presentationml/2006/main">
+  <p:cSld>
+    <p:spTree>
+      <p:nvGrpSpPr>
+        <p:cNvPr id="1" name=""/>
+        <p:cNvGrpSpPr/>
+        <p:nvPr/>
+      </p:nvGrpSpPr>
+      <p:grpSpPr>
+        <a:xfrm>
+          <a:off x="0" y="0"/>
+          <a:ext cx="0" cy="0"/>
+          <a:chOff x="0" y="0"/>
+          <a:chExt cx="0" cy="0"/>
+        </a:xfrm>
+      </p:grpSpPr>
+      <p:sp>
+        <p:nvSpPr>
+          <p:cNvPr id="3" name="Text Placeholder 2">
+            <a:extLst>
+              <a:ext uri="{FF2B5EF4-FFF2-40B4-BE49-F238E27FC236}">
+                <a16:creationId xmlns:a16="http://schemas.microsoft.com/office/drawing/2014/main" id="{6B312D43-2050-4E61-B211-D085BF78A53F}"/>
+              </a:ext>
+            </a:extLst>
+          </p:cNvPr>
+          <p:cNvSpPr>
+            <a:spLocks noGrp="1"/>
+          </p:cNvSpPr>
+          <p:nvPr>
+            <p:ph type="body" idx="1"/>
+          </p:nvPr>
+        </p:nvSpPr>
+        <p:spPr/>
+        <p:txBody>
+          <a:bodyPr/>
+          <a:lstStyle/>
+          <a:p>
+            <a:r>
+              <a:rPr lang="en-US" dirty="0"/>
+              <a:t>Issues</a:t>
+            </a:r>
+          </a:p>
+        </p:txBody>
+      </p:sp>
+      <p:sp>
+        <p:nvSpPr>
+          <p:cNvPr id="4" name="TextBox 3">
+            <a:extLst>
+              <a:ext uri="{FF2B5EF4-FFF2-40B4-BE49-F238E27FC236}">
+                <a16:creationId xmlns:a16="http://schemas.microsoft.com/office/drawing/2014/main" id="{1C195151-BF45-4630-B8F0-C34D2F2750D2}"/>
+              </a:ext>
+            </a:extLst>
+          </p:cNvPr>
+          <p:cNvSpPr txBox="1"/>
+          <p:nvPr/>
+        </p:nvSpPr>
+        <p:spPr>
+          <a:xfrm>
+            <a:off x="609600" y="1422115"/>
+            <a:ext cx="9580097" cy="3416320"/>
+          </a:xfrm>
+          <a:prstGeom prst="rect">
+            <a:avLst/>
+          </a:prstGeom>
+          <a:noFill/>
+        </p:spPr>
+        <p:txBody>
+          <a:bodyPr wrap="square" rtlCol="0">
+            <a:spAutoFit/>
+          </a:bodyPr>
+          <a:lstStyle/>
+          <a:p>
+            <a:pPr marL="342900" indent="-342900">
+              <a:buFont typeface="Arial" panose="020B0604020202020204" pitchFamily="34" charset="0"/>
+              <a:buChar char="•"/>
+            </a:pPr>
+            <a:r>
+              <a:rPr lang="en-US" sz="2400" dirty="0"/>
+              <a:t>Using clusters NLTK data was not able to spread-out to the other worker nodes</a:t>
+            </a:r>
+          </a:p>
+          <a:p>
+            <a:pPr marL="342900" indent="-342900">
+              <a:buFont typeface="Arial" panose="020B0604020202020204" pitchFamily="34" charset="0"/>
+              <a:buChar char="•"/>
+            </a:pPr>
+            <a:r>
+              <a:rPr lang="en-US" sz="2400" dirty="0" err="1"/>
+              <a:t>Gutils</a:t>
+            </a:r>
+            <a:r>
+              <a:rPr lang="en-US" sz="2400" dirty="0"/>
+              <a:t> in GCP was failing time to time</a:t>
+            </a:r>
+          </a:p>
+          <a:p>
+            <a:pPr marL="342900" indent="-342900">
+              <a:buFont typeface="Arial" panose="020B0604020202020204" pitchFamily="34" charset="0"/>
+              <a:buChar char="•"/>
+            </a:pPr>
+            <a:r>
+              <a:rPr lang="en-US" sz="2400" dirty="0"/>
+              <a:t>Long Running Times</a:t>
+            </a:r>
+          </a:p>
+          <a:p>
+            <a:pPr marL="342900" indent="-342900">
+              <a:buFont typeface="Arial" panose="020B0604020202020204" pitchFamily="34" charset="0"/>
+              <a:buChar char="•"/>
+            </a:pPr>
+            <a:endParaRPr lang="en-US" sz="2400" dirty="0"/>
+          </a:p>
+          <a:p>
+            <a:pPr marL="342900" indent="-342900">
+              <a:buFont typeface="Arial" panose="020B0604020202020204" pitchFamily="34" charset="0"/>
+              <a:buChar char="•"/>
+            </a:pPr>
+            <a:endParaRPr lang="en-US" sz="2400" dirty="0"/>
+          </a:p>
+          <a:p>
+            <a:pPr marL="342900" indent="-342900">
+              <a:buFont typeface="Arial" panose="020B0604020202020204" pitchFamily="34" charset="0"/>
+              <a:buChar char="•"/>
+            </a:pPr>
+            <a:endParaRPr lang="en-US" sz="2400" dirty="0"/>
+          </a:p>
+          <a:p>
+            <a:endParaRPr lang="en-US" sz="2400" dirty="0"/>
+          </a:p>
+          <a:p>
+            <a:r>
+              <a:rPr lang="en-US" sz="2400" dirty="0"/>
+              <a:t>	</a:t>
+            </a:r>
+          </a:p>
+        </p:txBody>
+      </p:sp>
+    </p:spTree>
+    <p:extLst>
+      <p:ext uri="{BB962C8B-B14F-4D97-AF65-F5344CB8AC3E}">
+        <p14:creationId xmlns:p14="http://schemas.microsoft.com/office/powerpoint/2010/main" val="3315663757"/>
+      </p:ext>
+    </p:extLst>
+  </p:cSld>
+  <p:clrMapOvr>
+    <a:masterClrMapping/>
+  </p:clrMapOvr>
+</p:sld>
+</file>
+
+<file path=ppt/slides/slide5.xml><?xml version="1.0" encoding="utf-8"?>
+<p:sld xmlns:a="http://schemas.openxmlformats.org/drawingml/2006/main" xmlns:r="http://schemas.openxmlformats.org/officeDocument/2006/relationships" xmlns:p="http://schemas.openxmlformats.org/presentationml/2006/main">
+  <p:cSld>
+    <p:spTree>
+      <p:nvGrpSpPr>
+        <p:cNvPr id="1" name=""/>
+        <p:cNvGrpSpPr/>
+        <p:nvPr/>
+      </p:nvGrpSpPr>
+      <p:grpSpPr>
+        <a:xfrm>
+          <a:off x="0" y="0"/>
+          <a:ext cx="0" cy="0"/>
+          <a:chOff x="0" y="0"/>
+          <a:chExt cx="0" cy="0"/>
+        </a:xfrm>
+      </p:grpSpPr>
+      <p:sp>
+        <p:nvSpPr>
+          <p:cNvPr id="3" name="Text Placeholder 2">
+            <a:extLst>
+              <a:ext uri="{FF2B5EF4-FFF2-40B4-BE49-F238E27FC236}">
+                <a16:creationId xmlns:a16="http://schemas.microsoft.com/office/drawing/2014/main" id="{6B312D43-2050-4E61-B211-D085BF78A53F}"/>
+              </a:ext>
+            </a:extLst>
+          </p:cNvPr>
+          <p:cNvSpPr>
+            <a:spLocks noGrp="1"/>
+          </p:cNvSpPr>
+          <p:nvPr>
+            <p:ph type="body" idx="1"/>
+          </p:nvPr>
+        </p:nvSpPr>
+        <p:spPr/>
+        <p:txBody>
+          <a:bodyPr/>
+          <a:lstStyle/>
+          <a:p>
+            <a:r>
+              <a:rPr lang="en-US" dirty="0" err="1"/>
+              <a:t>Github</a:t>
+            </a:r>
+            <a:endParaRPr lang="en-US" dirty="0"/>
+          </a:p>
+        </p:txBody>
+      </p:sp>
+      <p:sp>
+        <p:nvSpPr>
+          <p:cNvPr id="4" name="TextBox 3">
+            <a:extLst>
+              <a:ext uri="{FF2B5EF4-FFF2-40B4-BE49-F238E27FC236}">
+                <a16:creationId xmlns:a16="http://schemas.microsoft.com/office/drawing/2014/main" id="{1C195151-BF45-4630-B8F0-C34D2F2750D2}"/>
+              </a:ext>
+            </a:extLst>
+          </p:cNvPr>
+          <p:cNvSpPr txBox="1"/>
+          <p:nvPr/>
+        </p:nvSpPr>
+        <p:spPr>
+          <a:xfrm>
+            <a:off x="609600" y="1422115"/>
+            <a:ext cx="9580097" cy="2677656"/>
+          </a:xfrm>
+          <a:prstGeom prst="rect">
+            <a:avLst/>
+          </a:prstGeom>
+          <a:noFill/>
+        </p:spPr>
+        <p:txBody>
+          <a:bodyPr wrap="square" rtlCol="0">
+            <a:spAutoFit/>
+          </a:bodyPr>
+          <a:lstStyle/>
+          <a:p>
+            <a:pPr marL="342900" indent="-342900">
+              <a:buFont typeface="Arial" panose="020B0604020202020204" pitchFamily="34" charset="0"/>
+              <a:buChar char="•"/>
+            </a:pPr>
+            <a:r>
+              <a:rPr lang="en-US" sz="2400" dirty="0"/>
+              <a:t>Used Kanban Board for progress on project</a:t>
+            </a:r>
+          </a:p>
+          <a:p>
+            <a:pPr marL="342900" indent="-342900">
+              <a:buFont typeface="Arial" panose="020B0604020202020204" pitchFamily="34" charset="0"/>
+              <a:buChar char="•"/>
+            </a:pPr>
+            <a:r>
+              <a:rPr lang="en-US" sz="2400" dirty="0"/>
+              <a:t>Issues were documented for every step with solution for </a:t>
+            </a:r>
+            <a:r>
+              <a:rPr lang="en-US" sz="2400"/>
+              <a:t>the issue</a:t>
+            </a:r>
+          </a:p>
+          <a:p>
+            <a:pPr marL="342900" indent="-342900">
+              <a:buFont typeface="Arial" panose="020B0604020202020204" pitchFamily="34" charset="0"/>
+              <a:buChar char="•"/>
+            </a:pPr>
+            <a:endParaRPr lang="en-US" sz="2400" dirty="0"/>
+          </a:p>
+          <a:p>
+            <a:pPr marL="342900" indent="-342900">
+              <a:buFont typeface="Arial" panose="020B0604020202020204" pitchFamily="34" charset="0"/>
+              <a:buChar char="•"/>
+            </a:pPr>
+            <a:endParaRPr lang="en-US" sz="2400" dirty="0"/>
+          </a:p>
+          <a:p>
+            <a:pPr marL="342900" indent="-342900">
+              <a:buFont typeface="Arial" panose="020B0604020202020204" pitchFamily="34" charset="0"/>
+              <a:buChar char="•"/>
+            </a:pPr>
+            <a:endParaRPr lang="en-US" sz="2400" dirty="0"/>
+          </a:p>
+          <a:p>
+            <a:endParaRPr lang="en-US" sz="2400" dirty="0"/>
+          </a:p>
+          <a:p>
+            <a:r>
+              <a:rPr lang="en-US" sz="2400" dirty="0"/>
+              <a:t>	</a:t>
+            </a:r>
+          </a:p>
+        </p:txBody>
+      </p:sp>
+    </p:spTree>
+    <p:extLst>
+      <p:ext uri="{BB962C8B-B14F-4D97-AF65-F5344CB8AC3E}">
+        <p14:creationId xmlns:p14="http://schemas.microsoft.com/office/powerpoint/2010/main" val="1155593336"/>
       </p:ext>
     </p:extLst>
   </p:cSld>

</xml_diff>